<commit_message>
one more update on the figure
</commit_message>
<xml_diff>
--- a/images/Ch8/modify_figure_octupole_scan.pptx
+++ b/images/Ch8/modify_figure_octupole_scan.pptx
@@ -104,6 +104,11 @@
       </a:defRPr>
     </a:lvl9pPr>
   </p:defaultTextStyle>
+  <p:extLst>
+    <p:ext uri="{EFAFB233-063F-42B5-8137-9DF3F51BA10A}">
+      <p15:sldGuideLst xmlns:p15="http://schemas.microsoft.com/office/powerpoint/2012/main"/>
+    </p:ext>
+  </p:extLst>
 </p:presentation>
 </file>
 
@@ -3393,6 +3398,9 @@
             <a:avLst/>
           </a:prstGeom>
           <a:noFill/>
+          <a:ln>
+            <a:noFill/>
+          </a:ln>
         </p:spPr>
         <p:txBody>
           <a:bodyPr wrap="square" rtlCol="0">
@@ -3403,7 +3411,7 @@
             <a:r>
               <a:rPr lang="en-CH" sz="2400" dirty="0">
                 <a:solidFill>
-                  <a:schemeClr val="accent2"/>
+                  <a:srgbClr val="FF40FF"/>
                 </a:solidFill>
               </a:rPr>
               <a:t>No measurements: </a:t>
@@ -3413,14 +3421,14 @@
             <a:r>
               <a:rPr lang="en-GB" sz="2400" dirty="0">
                 <a:solidFill>
-                  <a:schemeClr val="accent2"/>
+                  <a:srgbClr val="FF40FF"/>
                 </a:solidFill>
               </a:rPr>
               <a:t>vertical instability</a:t>
             </a:r>
             <a:endParaRPr lang="en-CH" sz="2400" dirty="0">
               <a:solidFill>
-                <a:schemeClr val="accent2"/>
+                <a:srgbClr val="FF40FF"/>
               </a:solidFill>
             </a:endParaRPr>
           </a:p>
@@ -3450,7 +3458,7 @@
           </a:prstGeom>
           <a:ln w="28575">
             <a:solidFill>
-              <a:schemeClr val="accent2"/>
+              <a:srgbClr val="FF40FF"/>
             </a:solidFill>
             <a:prstDash val="lgDash"/>
           </a:ln>

</xml_diff>

<commit_message>
add why these results are considered a great success
</commit_message>
<xml_diff>
--- a/images/Ch8/modify_figure_octupole_scan.pptx
+++ b/images/Ch8/modify_figure_octupole_scan.pptx
@@ -3349,10 +3349,10 @@
       </p:grpSpPr>
       <p:pic>
         <p:nvPicPr>
-          <p:cNvPr id="6" name="Picture 5">
-            <a:extLst>
-              <a:ext uri="{FF2B5EF4-FFF2-40B4-BE49-F238E27FC236}">
-                <a16:creationId xmlns:a16="http://schemas.microsoft.com/office/drawing/2014/main" id="{7E56819A-A76E-D115-69EE-E9CF5D2BCE39}"/>
+          <p:cNvPr id="2" name="Picture 1">
+            <a:extLst>
+              <a:ext uri="{FF2B5EF4-FFF2-40B4-BE49-F238E27FC236}">
+                <a16:creationId xmlns:a16="http://schemas.microsoft.com/office/drawing/2014/main" id="{F14CC028-057C-6908-A2BF-46E7A717A76C}"/>
               </a:ext>
             </a:extLst>
           </p:cNvPr>
@@ -3369,8 +3369,8 @@
         </p:blipFill>
         <p:spPr>
           <a:xfrm>
-            <a:off x="2286000" y="12700"/>
-            <a:ext cx="7620000" cy="6832600"/>
+            <a:off x="2286000" y="6350"/>
+            <a:ext cx="7620000" cy="6845300"/>
           </a:xfrm>
           <a:prstGeom prst="rect">
             <a:avLst/>
@@ -3411,7 +3411,7 @@
             <a:r>
               <a:rPr lang="en-CH" sz="2400" dirty="0">
                 <a:solidFill>
-                  <a:srgbClr val="FF40FF"/>
+                  <a:schemeClr val="accent2"/>
                 </a:solidFill>
               </a:rPr>
               <a:t>No measurements: </a:t>
@@ -3421,14 +3421,14 @@
             <a:r>
               <a:rPr lang="en-GB" sz="2400" dirty="0">
                 <a:solidFill>
-                  <a:srgbClr val="FF40FF"/>
+                  <a:schemeClr val="accent2"/>
                 </a:solidFill>
               </a:rPr>
               <a:t>vertical instability</a:t>
             </a:r>
             <a:endParaRPr lang="en-CH" sz="2400" dirty="0">
               <a:solidFill>
-                <a:srgbClr val="FF40FF"/>
+                <a:schemeClr val="accent2"/>
               </a:solidFill>
             </a:endParaRPr>
           </a:p>
@@ -3458,7 +3458,7 @@
           </a:prstGeom>
           <a:ln w="28575">
             <a:solidFill>
-              <a:srgbClr val="FF40FF"/>
+              <a:schemeClr val="accent2"/>
             </a:solidFill>
             <a:prstDash val="lgDash"/>
           </a:ln>

</xml_diff>

<commit_message>
start additioanl measurements with cc rf noise
</commit_message>
<xml_diff>
--- a/images/Ch8/modify_figure_octupole_scan.pptx
+++ b/images/Ch8/modify_figure_octupole_scan.pptx
@@ -3349,10 +3349,10 @@
       </p:grpSpPr>
       <p:pic>
         <p:nvPicPr>
-          <p:cNvPr id="4" name="Picture 3">
-            <a:extLst>
-              <a:ext uri="{FF2B5EF4-FFF2-40B4-BE49-F238E27FC236}">
-                <a16:creationId xmlns:a16="http://schemas.microsoft.com/office/drawing/2014/main" id="{2E7FC24B-F078-3129-821E-7809385A3627}"/>
+          <p:cNvPr id="6" name="Picture 5">
+            <a:extLst>
+              <a:ext uri="{FF2B5EF4-FFF2-40B4-BE49-F238E27FC236}">
+                <a16:creationId xmlns:a16="http://schemas.microsoft.com/office/drawing/2014/main" id="{3EA3C9B3-4A3A-2299-1886-A71A79CDFE1D}"/>
               </a:ext>
             </a:extLst>
           </p:cNvPr>
@@ -3370,70 +3370,13 @@
         <p:spPr>
           <a:xfrm>
             <a:off x="2283249" y="0"/>
-            <a:ext cx="7617497" cy="6850800"/>
+            <a:ext cx="7617496" cy="6850800"/>
           </a:xfrm>
           <a:prstGeom prst="rect">
             <a:avLst/>
           </a:prstGeom>
         </p:spPr>
       </p:pic>
-      <p:sp>
-        <p:nvSpPr>
-          <p:cNvPr id="7" name="TextBox 6">
-            <a:extLst>
-              <a:ext uri="{FF2B5EF4-FFF2-40B4-BE49-F238E27FC236}">
-                <a16:creationId xmlns:a16="http://schemas.microsoft.com/office/drawing/2014/main" id="{83F378A4-E097-3376-5401-54804413BCDA}"/>
-              </a:ext>
-            </a:extLst>
-          </p:cNvPr>
-          <p:cNvSpPr txBox="1"/>
-          <p:nvPr/>
-        </p:nvSpPr>
-        <p:spPr>
-          <a:xfrm rot="16200000">
-            <a:off x="3634613" y="3611281"/>
-            <a:ext cx="2852169" cy="830997"/>
-          </a:xfrm>
-          <a:prstGeom prst="rect">
-            <a:avLst/>
-          </a:prstGeom>
-          <a:noFill/>
-          <a:ln>
-            <a:noFill/>
-          </a:ln>
-        </p:spPr>
-        <p:txBody>
-          <a:bodyPr wrap="square" rtlCol="0">
-            <a:spAutoFit/>
-          </a:bodyPr>
-          <a:lstStyle/>
-          <a:p>
-            <a:r>
-              <a:rPr lang="en-CH" sz="2400" dirty="0">
-                <a:solidFill>
-                  <a:schemeClr val="accent2"/>
-                </a:solidFill>
-              </a:rPr>
-              <a:t>No measurements: </a:t>
-            </a:r>
-          </a:p>
-          <a:p>
-            <a:r>
-              <a:rPr lang="en-GB" sz="2400" dirty="0">
-                <a:solidFill>
-                  <a:schemeClr val="accent2"/>
-                </a:solidFill>
-              </a:rPr>
-              <a:t>horizontal instability</a:t>
-            </a:r>
-            <a:endParaRPr lang="en-CH" sz="2400" dirty="0">
-              <a:solidFill>
-                <a:schemeClr val="accent2"/>
-              </a:solidFill>
-            </a:endParaRPr>
-          </a:p>
-        </p:txBody>
-      </p:sp>
       <p:cxnSp>
         <p:nvCxnSpPr>
           <p:cNvPr id="14" name="Straight Connector 13">
@@ -3478,6 +3421,63 @@
           </a:fontRef>
         </p:style>
       </p:cxnSp>
+      <p:sp>
+        <p:nvSpPr>
+          <p:cNvPr id="7" name="TextBox 6">
+            <a:extLst>
+              <a:ext uri="{FF2B5EF4-FFF2-40B4-BE49-F238E27FC236}">
+                <a16:creationId xmlns:a16="http://schemas.microsoft.com/office/drawing/2014/main" id="{83F378A4-E097-3376-5401-54804413BCDA}"/>
+              </a:ext>
+            </a:extLst>
+          </p:cNvPr>
+          <p:cNvSpPr txBox="1"/>
+          <p:nvPr/>
+        </p:nvSpPr>
+        <p:spPr>
+          <a:xfrm rot="16200000">
+            <a:off x="3634613" y="3611281"/>
+            <a:ext cx="2852169" cy="830997"/>
+          </a:xfrm>
+          <a:prstGeom prst="rect">
+            <a:avLst/>
+          </a:prstGeom>
+          <a:noFill/>
+          <a:ln>
+            <a:noFill/>
+          </a:ln>
+        </p:spPr>
+        <p:txBody>
+          <a:bodyPr wrap="square" rtlCol="0">
+            <a:spAutoFit/>
+          </a:bodyPr>
+          <a:lstStyle/>
+          <a:p>
+            <a:r>
+              <a:rPr lang="en-CH" sz="2400" dirty="0">
+                <a:solidFill>
+                  <a:schemeClr val="accent2"/>
+                </a:solidFill>
+              </a:rPr>
+              <a:t>No measurements: </a:t>
+            </a:r>
+          </a:p>
+          <a:p>
+            <a:r>
+              <a:rPr lang="en-GB" sz="2400" dirty="0">
+                <a:solidFill>
+                  <a:schemeClr val="accent2"/>
+                </a:solidFill>
+              </a:rPr>
+              <a:t>horizontal instability</a:t>
+            </a:r>
+            <a:endParaRPr lang="en-CH" sz="2400" dirty="0">
+              <a:solidFill>
+                <a:schemeClr val="accent2"/>
+              </a:solidFill>
+            </a:endParaRPr>
+          </a:p>
+        </p:txBody>
+      </p:sp>
     </p:spTree>
     <p:extLst>
       <p:ext uri="{BB962C8B-B14F-4D97-AF65-F5344CB8AC3E}">

</xml_diff>